<commit_message>
sistemate personae e presentazione
</commit_message>
<xml_diff>
--- a/WORKSHOP GESTIONE/presentazione/silvia.pptx
+++ b/WORKSHOP GESTIONE/presentazione/silvia.pptx
@@ -3571,13 +3571,9 @@
           <a:bodyPr/>
           <a:lstStyle/>
           <a:p>
-            <a:r>
-              <a:rPr lang="it-IT" smtClean="0"/>
-              <a:t>Immagini grafici</a:t>
-            </a:r>
-            <a:endParaRPr lang="it-IT" dirty="0" smtClean="0"/>
-          </a:p>
-          <a:p>
+            <a:pPr>
+              <a:buNone/>
+            </a:pPr>
             <a:endParaRPr lang="it-IT" dirty="0"/>
           </a:p>
         </p:txBody>

</xml_diff>